<commit_message>
update with arctic fox seqs
</commit_message>
<xml_diff>
--- a/plots/Figure1.pptx
+++ b/plots/Figure1.pptx
@@ -104,6 +104,11 @@
       </a:defRPr>
     </a:lvl9pPr>
   </p:defaultTextStyle>
+  <p:extLst>
+    <p:ext uri="{EFAFB233-063F-42B5-8137-9DF3F51BA10A}">
+      <p15:sldGuideLst xmlns:p15="http://schemas.microsoft.com/office/powerpoint/2012/main"/>
+    </p:ext>
+  </p:extLst>
 </p:presentation>
 </file>
 
@@ -256,7 +261,7 @@
           <a:p>
             <a:fld id="{E2AE95FA-7512-E345-AC84-6AB1920CB4BA}" type="datetimeFigureOut">
               <a:rPr lang="en-US" smtClean="0"/>
-              <a:t>3/13/24</a:t>
+              <a:t>3/29/24</a:t>
             </a:fld>
             <a:endParaRPr lang="en-US"/>
           </a:p>
@@ -456,7 +461,7 @@
           <a:p>
             <a:fld id="{E2AE95FA-7512-E345-AC84-6AB1920CB4BA}" type="datetimeFigureOut">
               <a:rPr lang="en-US" smtClean="0"/>
-              <a:t>3/13/24</a:t>
+              <a:t>3/29/24</a:t>
             </a:fld>
             <a:endParaRPr lang="en-US"/>
           </a:p>
@@ -666,7 +671,7 @@
           <a:p>
             <a:fld id="{E2AE95FA-7512-E345-AC84-6AB1920CB4BA}" type="datetimeFigureOut">
               <a:rPr lang="en-US" smtClean="0"/>
-              <a:t>3/13/24</a:t>
+              <a:t>3/29/24</a:t>
             </a:fld>
             <a:endParaRPr lang="en-US"/>
           </a:p>
@@ -866,7 +871,7 @@
           <a:p>
             <a:fld id="{E2AE95FA-7512-E345-AC84-6AB1920CB4BA}" type="datetimeFigureOut">
               <a:rPr lang="en-US" smtClean="0"/>
-              <a:t>3/13/24</a:t>
+              <a:t>3/29/24</a:t>
             </a:fld>
             <a:endParaRPr lang="en-US"/>
           </a:p>
@@ -1142,7 +1147,7 @@
           <a:p>
             <a:fld id="{E2AE95FA-7512-E345-AC84-6AB1920CB4BA}" type="datetimeFigureOut">
               <a:rPr lang="en-US" smtClean="0"/>
-              <a:t>3/13/24</a:t>
+              <a:t>3/29/24</a:t>
             </a:fld>
             <a:endParaRPr lang="en-US"/>
           </a:p>
@@ -1410,7 +1415,7 @@
           <a:p>
             <a:fld id="{E2AE95FA-7512-E345-AC84-6AB1920CB4BA}" type="datetimeFigureOut">
               <a:rPr lang="en-US" smtClean="0"/>
-              <a:t>3/13/24</a:t>
+              <a:t>3/29/24</a:t>
             </a:fld>
             <a:endParaRPr lang="en-US"/>
           </a:p>
@@ -1825,7 +1830,7 @@
           <a:p>
             <a:fld id="{E2AE95FA-7512-E345-AC84-6AB1920CB4BA}" type="datetimeFigureOut">
               <a:rPr lang="en-US" smtClean="0"/>
-              <a:t>3/13/24</a:t>
+              <a:t>3/29/24</a:t>
             </a:fld>
             <a:endParaRPr lang="en-US"/>
           </a:p>
@@ -1967,7 +1972,7 @@
           <a:p>
             <a:fld id="{E2AE95FA-7512-E345-AC84-6AB1920CB4BA}" type="datetimeFigureOut">
               <a:rPr lang="en-US" smtClean="0"/>
-              <a:t>3/13/24</a:t>
+              <a:t>3/29/24</a:t>
             </a:fld>
             <a:endParaRPr lang="en-US"/>
           </a:p>
@@ -2080,7 +2085,7 @@
           <a:p>
             <a:fld id="{E2AE95FA-7512-E345-AC84-6AB1920CB4BA}" type="datetimeFigureOut">
               <a:rPr lang="en-US" smtClean="0"/>
-              <a:t>3/13/24</a:t>
+              <a:t>3/29/24</a:t>
             </a:fld>
             <a:endParaRPr lang="en-US"/>
           </a:p>
@@ -2393,7 +2398,7 @@
           <a:p>
             <a:fld id="{E2AE95FA-7512-E345-AC84-6AB1920CB4BA}" type="datetimeFigureOut">
               <a:rPr lang="en-US" smtClean="0"/>
-              <a:t>3/13/24</a:t>
+              <a:t>3/29/24</a:t>
             </a:fld>
             <a:endParaRPr lang="en-US"/>
           </a:p>
@@ -2682,7 +2687,7 @@
           <a:p>
             <a:fld id="{E2AE95FA-7512-E345-AC84-6AB1920CB4BA}" type="datetimeFigureOut">
               <a:rPr lang="en-US" smtClean="0"/>
-              <a:t>3/13/24</a:t>
+              <a:t>3/29/24</a:t>
             </a:fld>
             <a:endParaRPr lang="en-US"/>
           </a:p>
@@ -2925,7 +2930,7 @@
           <a:p>
             <a:fld id="{E2AE95FA-7512-E345-AC84-6AB1920CB4BA}" type="datetimeFigureOut">
               <a:rPr lang="en-US" smtClean="0"/>
-              <a:t>3/13/24</a:t>
+              <a:t>3/29/24</a:t>
             </a:fld>
             <a:endParaRPr lang="en-US"/>
           </a:p>
@@ -3344,10 +3349,10 @@
       </p:grpSpPr>
       <p:grpSp>
         <p:nvGrpSpPr>
-          <p:cNvPr id="32" name="Group 31">
-            <a:extLst>
-              <a:ext uri="{FF2B5EF4-FFF2-40B4-BE49-F238E27FC236}">
-                <a16:creationId xmlns:a16="http://schemas.microsoft.com/office/drawing/2014/main" id="{BA0970A9-2B38-A363-E13B-DCFADC849114}"/>
+          <p:cNvPr id="3" name="Group 2">
+            <a:extLst>
+              <a:ext uri="{FF2B5EF4-FFF2-40B4-BE49-F238E27FC236}">
+                <a16:creationId xmlns:a16="http://schemas.microsoft.com/office/drawing/2014/main" id="{EFD91C7B-233D-C8B7-AE62-F29E87C97EC2}"/>
               </a:ext>
             </a:extLst>
           </p:cNvPr>
@@ -3356,15 +3361,15 @@
         </p:nvGrpSpPr>
         <p:grpSpPr>
           <a:xfrm>
-            <a:off x="2654889" y="216310"/>
-            <a:ext cx="6862737" cy="5968180"/>
-            <a:chOff x="2654889" y="216310"/>
-            <a:chExt cx="6862737" cy="5968180"/>
+            <a:off x="2597977" y="-278971"/>
+            <a:ext cx="6996046" cy="6687519"/>
+            <a:chOff x="2664631" y="170480"/>
+            <a:chExt cx="6996046" cy="6687519"/>
           </a:xfrm>
         </p:grpSpPr>
         <p:pic>
           <p:nvPicPr>
-            <p:cNvPr id="5" name="Picture 4" descr="A graph of different types of bats&#10;&#10;Description automatically generated">
+            <p:cNvPr id="5" name="Picture 4">
               <a:extLst>
                 <a:ext uri="{FF2B5EF4-FFF2-40B4-BE49-F238E27FC236}">
                   <a16:creationId xmlns:a16="http://schemas.microsoft.com/office/drawing/2014/main" id="{F1996B4F-9AE1-16DA-6C02-780498BF7195}"/>
@@ -3378,13 +3383,13 @@
           </p:nvPicPr>
           <p:blipFill rotWithShape="1">
             <a:blip r:embed="rId2"/>
-            <a:srcRect t="3155" b="9821"/>
+            <a:srcRect t="2485" b="-1"/>
             <a:stretch/>
           </p:blipFill>
           <p:spPr>
             <a:xfrm>
-              <a:off x="2654889" y="216310"/>
-              <a:ext cx="6858000" cy="5968180"/>
+              <a:off x="2664631" y="170480"/>
+              <a:ext cx="6858000" cy="6687519"/>
             </a:xfrm>
             <a:prstGeom prst="rect">
               <a:avLst/>
@@ -3405,7 +3410,7 @@
           </p:nvSpPr>
           <p:spPr>
             <a:xfrm>
-              <a:off x="5149463" y="1480271"/>
+              <a:off x="5357570" y="1037810"/>
               <a:ext cx="1503360" cy="276999"/>
             </a:xfrm>
             <a:prstGeom prst="rect">
@@ -3444,7 +3449,7 @@
           </p:nvSpPr>
           <p:spPr>
             <a:xfrm>
-              <a:off x="5015794" y="2354790"/>
+              <a:off x="5272999" y="2126832"/>
               <a:ext cx="1540230" cy="276999"/>
             </a:xfrm>
             <a:prstGeom prst="rect">
@@ -3483,7 +3488,7 @@
           </p:nvSpPr>
           <p:spPr>
             <a:xfrm>
-              <a:off x="5263257" y="2742678"/>
+              <a:off x="5306504" y="2666199"/>
               <a:ext cx="1015534" cy="276999"/>
             </a:xfrm>
             <a:prstGeom prst="rect">
@@ -3522,7 +3527,7 @@
           </p:nvSpPr>
           <p:spPr>
             <a:xfrm>
-              <a:off x="5347828" y="3233282"/>
+              <a:off x="5317121" y="3155173"/>
               <a:ext cx="1020344" cy="276999"/>
             </a:xfrm>
             <a:prstGeom prst="rect">
@@ -3561,7 +3566,7 @@
           </p:nvSpPr>
           <p:spPr>
             <a:xfrm>
-              <a:off x="5470751" y="4069190"/>
+              <a:off x="5508006" y="3913821"/>
               <a:ext cx="638573" cy="276999"/>
             </a:xfrm>
             <a:prstGeom prst="rect">
@@ -3600,7 +3605,7 @@
           </p:nvSpPr>
           <p:spPr>
             <a:xfrm>
-              <a:off x="5431973" y="4529747"/>
+              <a:off x="5441715" y="4379112"/>
               <a:ext cx="688265" cy="276999"/>
             </a:xfrm>
             <a:prstGeom prst="rect">
@@ -3639,7 +3644,7 @@
           </p:nvSpPr>
           <p:spPr>
             <a:xfrm>
-              <a:off x="4940339" y="4945321"/>
+              <a:off x="4851473" y="4929788"/>
               <a:ext cx="824521" cy="276999"/>
             </a:xfrm>
             <a:prstGeom prst="rect">
@@ -3678,7 +3683,7 @@
           </p:nvSpPr>
           <p:spPr>
             <a:xfrm>
-              <a:off x="6327723" y="5205638"/>
+              <a:off x="5814040" y="5163709"/>
               <a:ext cx="1099083" cy="276999"/>
             </a:xfrm>
             <a:prstGeom prst="rect">
@@ -3717,7 +3722,7 @@
           </p:nvSpPr>
           <p:spPr>
             <a:xfrm>
-              <a:off x="5075899" y="5374915"/>
+              <a:off x="5523370" y="4652789"/>
               <a:ext cx="618311" cy="276999"/>
             </a:xfrm>
             <a:prstGeom prst="rect">
@@ -3756,7 +3761,7 @@
           </p:nvSpPr>
           <p:spPr>
             <a:xfrm>
-              <a:off x="8495071" y="5594633"/>
+              <a:off x="8638122" y="5440708"/>
               <a:ext cx="1022555" cy="261610"/>
             </a:xfrm>
             <a:prstGeom prst="rect">
@@ -3798,7 +3803,7 @@
           </p:nvSpPr>
           <p:spPr>
             <a:xfrm>
-              <a:off x="4958455" y="3639981"/>
+              <a:off x="4933948" y="3512954"/>
               <a:ext cx="1015534" cy="276999"/>
             </a:xfrm>
             <a:prstGeom prst="rect">
@@ -3819,6 +3824,45 @@
                   </a:solidFill>
                 </a:rPr>
                 <a:t>Asian SEA2a</a:t>
+              </a:r>
+            </a:p>
+          </p:txBody>
+        </p:sp>
+        <p:sp>
+          <p:nvSpPr>
+            <p:cNvPr id="2" name="TextBox 1">
+              <a:extLst>
+                <a:ext uri="{FF2B5EF4-FFF2-40B4-BE49-F238E27FC236}">
+                  <a16:creationId xmlns:a16="http://schemas.microsoft.com/office/drawing/2014/main" id="{4703CD06-107D-889F-E163-5FAFB04E19F2}"/>
+                </a:ext>
+              </a:extLst>
+            </p:cNvPr>
+            <p:cNvSpPr txBox="1"/>
+            <p:nvPr/>
+          </p:nvSpPr>
+          <p:spPr>
+            <a:xfrm>
+              <a:off x="5179367" y="2292698"/>
+              <a:ext cx="695511" cy="276999"/>
+            </a:xfrm>
+            <a:prstGeom prst="rect">
+              <a:avLst/>
+            </a:prstGeom>
+            <a:noFill/>
+          </p:spPr>
+          <p:txBody>
+            <a:bodyPr wrap="none" rtlCol="0">
+              <a:spAutoFit/>
+            </a:bodyPr>
+            <a:lstStyle/>
+            <a:p>
+              <a:r>
+                <a:rPr lang="en-US" sz="1200" dirty="0">
+                  <a:solidFill>
+                    <a:srgbClr val="CCDEAA"/>
+                  </a:solidFill>
+                </a:rPr>
+                <a:t>Arctic A</a:t>
               </a:r>
             </a:p>
           </p:txBody>

</xml_diff>